<commit_message>
Add dictionaries to lessons.
</commit_message>
<xml_diff>
--- a/lectures3/Pythonlearn-09-Dictionaries.pptx
+++ b/lectures3/Pythonlearn-09-Dictionaries.pptx
@@ -5888,6 +5888,14 @@
   <p:clrMapOvr>
     <a:masterClrMapping/>
   </p:clrMapOvr>
+  <mc:AlternateContent xmlns:mc="http://schemas.openxmlformats.org/markup-compatibility/2006">
+    <mc:Choice xmlns:p14="http://schemas.microsoft.com/office/powerpoint/2010/main" Requires="p14">
+      <p:transition spd="slow" p14:dur="2000" advClick="0"/>
+    </mc:Choice>
+    <mc:Fallback>
+      <p:transition spd="slow" advClick="0"/>
+    </mc:Fallback>
+  </mc:AlternateContent>
   <p:timing>
     <p:tnLst>
       <p:par>
@@ -17388,7 +17396,7 @@
                 <a:cs typeface="Arial" charset="0"/>
                 <a:sym typeface="Cabin"/>
               </a:rPr>
-              <a:t>Counting Words</a:t>
+              <a:t>Counting Words in Text</a:t>
             </a:r>
             <a:endParaRPr lang="en-US" sz="7600" u="none" strike="noStrike" cap="none" dirty="0">
               <a:solidFill>

</xml_diff>

<commit_message>
More from Konstantia :)
</commit_message>
<xml_diff>
--- a/lectures3/Pythonlearn-09-Dictionaries.pptx
+++ b/lectures3/Pythonlearn-09-Dictionaries.pptx
@@ -245,7 +245,7 @@
   </p:defaultTextStyle>
   <p:extLst>
     <p:ext uri="{EFAFB233-063F-42B5-8137-9DF3F51BA10A}">
-      <p15:sldGuideLst xmlns:p15="http://schemas.microsoft.com/office/powerpoint/2012/main" xmlns="">
+      <p15:sldGuideLst xmlns:p15="http://schemas.microsoft.com/office/powerpoint/2012/main">
         <p15:guide id="1" orient="horz" pos="2880">
           <p15:clr>
             <a:srgbClr val="A4A3A4"/>
@@ -5649,7 +5649,7 @@
   <p:timing>
     <p:tnLst>
       <p:par>
-        <p:cTn xmlns:p14="http://schemas.microsoft.com/office/powerpoint/2010/main" id="1" dur="indefinite" restart="never" nodeType="tmRoot"/>
+        <p:cTn id="1" dur="indefinite" restart="never" nodeType="tmRoot"/>
       </p:par>
     </p:tnLst>
   </p:timing>
@@ -6608,7 +6608,7 @@
   <p:timing>
     <p:tnLst>
       <p:par>
-        <p:cTn xmlns:p14="http://schemas.microsoft.com/office/powerpoint/2010/main" id="1" dur="indefinite" restart="never" nodeType="tmRoot"/>
+        <p:cTn id="1" dur="indefinite" restart="never" nodeType="tmRoot"/>
       </p:par>
     </p:tnLst>
   </p:timing>
@@ -6697,7 +6697,7 @@
   <p:timing>
     <p:tnLst>
       <p:par>
-        <p:cTn xmlns:p14="http://schemas.microsoft.com/office/powerpoint/2010/main" id="1" dur="indefinite" restart="never" nodeType="tmRoot"/>
+        <p:cTn id="1" dur="indefinite" restart="never" nodeType="tmRoot"/>
       </p:par>
     </p:tnLst>
   </p:timing>
@@ -7527,7 +7527,7 @@
   <p:timing>
     <p:tnLst>
       <p:par>
-        <p:cTn xmlns:p14="http://schemas.microsoft.com/office/powerpoint/2010/main" id="1" dur="indefinite" restart="never" nodeType="tmRoot"/>
+        <p:cTn id="1" dur="indefinite" restart="never" nodeType="tmRoot"/>
       </p:par>
     </p:tnLst>
   </p:timing>
@@ -8384,7 +8384,7 @@
   <p:timing>
     <p:tnLst>
       <p:par>
-        <p:cTn xmlns:p14="http://schemas.microsoft.com/office/powerpoint/2010/main" id="1" dur="indefinite" restart="never" nodeType="tmRoot"/>
+        <p:cTn id="1" dur="indefinite" restart="never" nodeType="tmRoot"/>
       </p:par>
     </p:tnLst>
   </p:timing>
@@ -9591,7 +9591,7 @@
   <p:timing>
     <p:tnLst>
       <p:par>
-        <p:cTn xmlns:p14="http://schemas.microsoft.com/office/powerpoint/2010/main" id="1" dur="indefinite" restart="never" nodeType="tmRoot"/>
+        <p:cTn id="1" dur="indefinite" restart="never" nodeType="tmRoot"/>
       </p:par>
     </p:tnLst>
   </p:timing>
@@ -10301,7 +10301,7 @@
   <p:timing>
     <p:tnLst>
       <p:par>
-        <p:cTn xmlns:p14="http://schemas.microsoft.com/office/powerpoint/2010/main" id="1" dur="indefinite" restart="never" nodeType="tmRoot"/>
+        <p:cTn id="1" dur="indefinite" restart="never" nodeType="tmRoot"/>
       </p:par>
     </p:tnLst>
   </p:timing>
@@ -11538,7 +11538,7 @@
   <p:timing>
     <p:tnLst>
       <p:par>
-        <p:cTn xmlns:p14="http://schemas.microsoft.com/office/powerpoint/2010/main" id="1" dur="indefinite" restart="never" nodeType="tmRoot"/>
+        <p:cTn id="1" dur="indefinite" restart="never" nodeType="tmRoot"/>
       </p:par>
     </p:tnLst>
   </p:timing>
@@ -12629,7 +12629,7 @@
   <p:timing>
     <p:tnLst>
       <p:par>
-        <p:cTn xmlns:p14="http://schemas.microsoft.com/office/powerpoint/2010/main" id="1" dur="indefinite" restart="never" nodeType="tmRoot"/>
+        <p:cTn id="1" dur="indefinite" restart="never" nodeType="tmRoot"/>
       </p:par>
     </p:tnLst>
   </p:timing>
@@ -13657,7 +13657,7 @@
   <p:timing>
     <p:tnLst>
       <p:par>
-        <p:cTn xmlns:p14="http://schemas.microsoft.com/office/powerpoint/2010/main" id="1" dur="indefinite" restart="never" nodeType="tmRoot"/>
+        <p:cTn id="1" dur="indefinite" restart="never" nodeType="tmRoot"/>
       </p:par>
     </p:tnLst>
   </p:timing>
@@ -14429,7 +14429,7 @@
   <p:timing>
     <p:tnLst>
       <p:par>
-        <p:cTn xmlns:p14="http://schemas.microsoft.com/office/powerpoint/2010/main" id="1" dur="indefinite" restart="never" nodeType="tmRoot"/>
+        <p:cTn id="1" dur="indefinite" restart="never" nodeType="tmRoot"/>
       </p:par>
     </p:tnLst>
   </p:timing>
@@ -14807,7 +14807,7 @@
   <p:timing>
     <p:tnLst>
       <p:par>
-        <p:cTn xmlns:p14="http://schemas.microsoft.com/office/powerpoint/2010/main" id="1" dur="indefinite" restart="never" nodeType="tmRoot"/>
+        <p:cTn id="1" dur="indefinite" restart="never" nodeType="tmRoot"/>
       </p:par>
     </p:tnLst>
   </p:timing>
@@ -15270,7 +15270,7 @@
   <p:timing>
     <p:tnLst>
       <p:par>
-        <p:cTn xmlns:p14="http://schemas.microsoft.com/office/powerpoint/2010/main" id="1" dur="indefinite" restart="never" nodeType="tmRoot"/>
+        <p:cTn id="1" dur="indefinite" restart="never" nodeType="tmRoot"/>
       </p:par>
     </p:tnLst>
   </p:timing>
@@ -16241,7 +16241,7 @@
   <p:timing>
     <p:tnLst>
       <p:par>
-        <p:cTn xmlns:p14="http://schemas.microsoft.com/office/powerpoint/2010/main" id="1" dur="indefinite" restart="never" nodeType="tmRoot"/>
+        <p:cTn id="1" dur="indefinite" restart="never" nodeType="tmRoot"/>
       </p:par>
     </p:tnLst>
   </p:timing>
@@ -16844,7 +16844,7 @@
   <p:timing>
     <p:tnLst>
       <p:par>
-        <p:cTn xmlns:p14="http://schemas.microsoft.com/office/powerpoint/2010/main" id="1" dur="indefinite" restart="never" nodeType="tmRoot"/>
+        <p:cTn id="1" dur="indefinite" restart="never" nodeType="tmRoot"/>
       </p:par>
     </p:tnLst>
   </p:timing>
@@ -17961,7 +17961,7 @@
   <p:timing>
     <p:tnLst>
       <p:par>
-        <p:cTn xmlns:p14="http://schemas.microsoft.com/office/powerpoint/2010/main" id="1" dur="indefinite" restart="never" nodeType="tmRoot"/>
+        <p:cTn id="1" dur="indefinite" restart="never" nodeType="tmRoot"/>
       </p:par>
     </p:tnLst>
   </p:timing>
@@ -18957,7 +18957,7 @@
   <p:timing>
     <p:tnLst>
       <p:par>
-        <p:cTn xmlns:p14="http://schemas.microsoft.com/office/powerpoint/2010/main" id="1" dur="indefinite" restart="never" nodeType="tmRoot"/>
+        <p:cTn id="1" dur="indefinite" restart="never" nodeType="tmRoot"/>
       </p:par>
     </p:tnLst>
   </p:timing>
@@ -19503,7 +19503,7 @@
                 <a:cs typeface="Courier"/>
                 <a:sym typeface="Courier New"/>
               </a:rPr>
-              <a:t>print(</a:t>
+              <a:t>print(list(</a:t>
             </a:r>
             <a:r>
               <a:rPr lang="en-US" sz="2500" i="0" u="none" strike="noStrike" cap="none" dirty="0" err="1" smtClean="0">
@@ -19540,6 +19540,18 @@
                 <a:sym typeface="Courier New"/>
               </a:rPr>
               <a:t>()</a:t>
+            </a:r>
+            <a:r>
+              <a:rPr lang="en-US" sz="2500" i="0" u="none" strike="noStrike" cap="none" dirty="0" smtClean="0">
+                <a:solidFill>
+                  <a:srgbClr val="FFFF00"/>
+                </a:solidFill>
+                <a:latin typeface="Courier"/>
+                <a:ea typeface="Courier"/>
+                <a:cs typeface="Courier"/>
+                <a:sym typeface="Courier New"/>
+              </a:rPr>
+              <a:t>)</a:t>
             </a:r>
             <a:r>
               <a:rPr lang="en-US" sz="2500" dirty="0" smtClean="0">
@@ -19683,7 +19695,7 @@
                 <a:cs typeface="Courier"/>
                 <a:sym typeface="Courier New"/>
               </a:rPr>
-              <a:t>print(</a:t>
+              <a:t>print(list(</a:t>
             </a:r>
             <a:r>
               <a:rPr lang="en-US" sz="2500" i="0" u="none" strike="noStrike" cap="none" dirty="0" err="1" smtClean="0">
@@ -19719,7 +19731,7 @@
                 <a:cs typeface="Courier"/>
                 <a:sym typeface="Courier New"/>
               </a:rPr>
-              <a:t>()</a:t>
+              <a:t>())</a:t>
             </a:r>
             <a:r>
               <a:rPr lang="en-US" sz="2500" dirty="0" smtClean="0">
@@ -19815,7 +19827,7 @@
                 <a:cs typeface="Courier"/>
                 <a:sym typeface="Courier New"/>
               </a:rPr>
-              <a:t>print(</a:t>
+              <a:t>print(list(</a:t>
             </a:r>
             <a:r>
               <a:rPr lang="en-US" sz="2500" i="0" u="none" strike="noStrike" cap="none" dirty="0" err="1" smtClean="0">
@@ -19863,7 +19875,7 @@
                 <a:cs typeface="Courier"/>
                 <a:sym typeface="Courier New"/>
               </a:rPr>
-              <a:t>)</a:t>
+              <a:t>))</a:t>
             </a:r>
             <a:endParaRPr lang="en-US" sz="2500" i="0" u="none" strike="noStrike" cap="none" dirty="0" smtClean="0">
               <a:solidFill>
@@ -20126,7 +20138,7 @@
   <p:timing>
     <p:tnLst>
       <p:par>
-        <p:cTn xmlns:p14="http://schemas.microsoft.com/office/powerpoint/2010/main" id="1" dur="indefinite" restart="never" nodeType="tmRoot"/>
+        <p:cTn id="1" dur="indefinite" restart="never" nodeType="tmRoot"/>
       </p:par>
     </p:tnLst>
   </p:timing>
@@ -21487,7 +21499,7 @@
   <p:timing>
     <p:tnLst>
       <p:par>
-        <p:cTn xmlns:p14="http://schemas.microsoft.com/office/powerpoint/2010/main" id="1" dur="indefinite" restart="never" nodeType="tmRoot"/>
+        <p:cTn id="1" dur="indefinite" restart="never" nodeType="tmRoot"/>
       </p:par>
     </p:tnLst>
   </p:timing>
@@ -22900,7 +22912,7 @@
   <p:timing>
     <p:tnLst>
       <p:par>
-        <p:cTn xmlns:p14="http://schemas.microsoft.com/office/powerpoint/2010/main" id="1" dur="indefinite" restart="never" nodeType="tmRoot"/>
+        <p:cTn id="1" dur="indefinite" restart="never" nodeType="tmRoot"/>
       </p:par>
     </p:tnLst>
   </p:timing>
@@ -23016,7 +23028,7 @@
   <p:timing>
     <p:tnLst>
       <p:par>
-        <p:cTn xmlns:p14="http://schemas.microsoft.com/office/powerpoint/2010/main" id="1" dur="indefinite" restart="never" nodeType="tmRoot"/>
+        <p:cTn id="1" dur="indefinite" restart="never" nodeType="tmRoot"/>
       </p:par>
     </p:tnLst>
   </p:timing>
@@ -23541,7 +23553,7 @@
   <p:timing>
     <p:tnLst>
       <p:par>
-        <p:cTn xmlns:p14="http://schemas.microsoft.com/office/powerpoint/2010/main" id="1" dur="indefinite" restart="never" nodeType="tmRoot"/>
+        <p:cTn id="1" dur="indefinite" restart="never" nodeType="tmRoot"/>
       </p:par>
     </p:tnLst>
   </p:timing>
@@ -23845,7 +23857,7 @@
   <p:timing>
     <p:tnLst>
       <p:par>
-        <p:cTn xmlns:p14="http://schemas.microsoft.com/office/powerpoint/2010/main" id="1" dur="indefinite" restart="never" nodeType="tmRoot"/>
+        <p:cTn id="1" dur="indefinite" restart="never" nodeType="tmRoot"/>
       </p:par>
     </p:tnLst>
   </p:timing>
@@ -24319,7 +24331,7 @@
   <p:timing>
     <p:tnLst>
       <p:par>
-        <p:cTn xmlns:p14="http://schemas.microsoft.com/office/powerpoint/2010/main" id="1" dur="indefinite" restart="never" nodeType="tmRoot"/>
+        <p:cTn id="1" dur="indefinite" restart="never" nodeType="tmRoot"/>
       </p:par>
     </p:tnLst>
   </p:timing>
@@ -24819,7 +24831,7 @@
   <p:timing>
     <p:tnLst>
       <p:par>
-        <p:cTn xmlns:p14="http://schemas.microsoft.com/office/powerpoint/2010/main" id="1" dur="indefinite" restart="never" nodeType="tmRoot"/>
+        <p:cTn id="1" dur="indefinite" restart="never" nodeType="tmRoot"/>
       </p:par>
     </p:tnLst>
   </p:timing>
@@ -25160,7 +25172,7 @@
   <p:timing>
     <p:tnLst>
       <p:par>
-        <p:cTn xmlns:p14="http://schemas.microsoft.com/office/powerpoint/2010/main" id="1" dur="indefinite" restart="never" nodeType="tmRoot"/>
+        <p:cTn id="1" dur="indefinite" restart="never" nodeType="tmRoot"/>
       </p:par>
     </p:tnLst>
   </p:timing>
@@ -26252,7 +26264,7 @@
   <p:timing>
     <p:tnLst>
       <p:par>
-        <p:cTn xmlns:p14="http://schemas.microsoft.com/office/powerpoint/2010/main" id="1" dur="indefinite" restart="never" nodeType="tmRoot"/>
+        <p:cTn id="1" dur="indefinite" restart="never" nodeType="tmRoot"/>
       </p:par>
     </p:tnLst>
   </p:timing>
@@ -27888,7 +27900,7 @@
   <p:timing>
     <p:tnLst>
       <p:par>
-        <p:cTn xmlns:p14="http://schemas.microsoft.com/office/powerpoint/2010/main" id="1" dur="indefinite" restart="never" nodeType="tmRoot"/>
+        <p:cTn id="1" dur="indefinite" restart="never" nodeType="tmRoot"/>
       </p:par>
     </p:tnLst>
   </p:timing>
@@ -30260,7 +30272,7 @@
   <p:timing>
     <p:tnLst>
       <p:par>
-        <p:cTn xmlns:p14="http://schemas.microsoft.com/office/powerpoint/2010/main" id="1" dur="indefinite" restart="never" nodeType="tmRoot"/>
+        <p:cTn id="1" dur="indefinite" restart="never" nodeType="tmRoot"/>
       </p:par>
     </p:tnLst>
   </p:timing>

</xml_diff>